<commit_message>
Little changes on the presentation and Model attributes
</commit_message>
<xml_diff>
--- a/Error Handling presentation.pptx
+++ b/Error Handling presentation.pptx
@@ -5,10 +5,10 @@
     <p:sldMasterId id="2147483648" r:id="rId1"/>
   </p:sldMasterIdLst>
   <p:notesMasterIdLst>
-    <p:notesMasterId r:id="rId36"/>
+    <p:notesMasterId r:id="rId39"/>
   </p:notesMasterIdLst>
   <p:handoutMasterIdLst>
-    <p:handoutMasterId r:id="rId37"/>
+    <p:handoutMasterId r:id="rId40"/>
   </p:handoutMasterIdLst>
   <p:sldIdLst>
     <p:sldId id="256" r:id="rId2"/>
@@ -26,25 +26,28 @@
     <p:sldId id="292" r:id="rId14"/>
     <p:sldId id="293" r:id="rId15"/>
     <p:sldId id="294" r:id="rId16"/>
-    <p:sldId id="270" r:id="rId17"/>
-    <p:sldId id="312" r:id="rId18"/>
+    <p:sldId id="312" r:id="rId17"/>
+    <p:sldId id="270" r:id="rId18"/>
     <p:sldId id="271" r:id="rId19"/>
-    <p:sldId id="272" r:id="rId20"/>
-    <p:sldId id="314" r:id="rId21"/>
-    <p:sldId id="313" r:id="rId22"/>
-    <p:sldId id="299" r:id="rId23"/>
-    <p:sldId id="300" r:id="rId24"/>
-    <p:sldId id="301" r:id="rId25"/>
-    <p:sldId id="302" r:id="rId26"/>
-    <p:sldId id="303" r:id="rId27"/>
-    <p:sldId id="304" r:id="rId28"/>
-    <p:sldId id="305" r:id="rId29"/>
-    <p:sldId id="306" r:id="rId30"/>
-    <p:sldId id="295" r:id="rId31"/>
-    <p:sldId id="296" r:id="rId32"/>
-    <p:sldId id="297" r:id="rId33"/>
-    <p:sldId id="298" r:id="rId34"/>
-    <p:sldId id="310" r:id="rId35"/>
+    <p:sldId id="315" r:id="rId20"/>
+    <p:sldId id="316" r:id="rId21"/>
+    <p:sldId id="272" r:id="rId22"/>
+    <p:sldId id="314" r:id="rId23"/>
+    <p:sldId id="313" r:id="rId24"/>
+    <p:sldId id="299" r:id="rId25"/>
+    <p:sldId id="300" r:id="rId26"/>
+    <p:sldId id="301" r:id="rId27"/>
+    <p:sldId id="302" r:id="rId28"/>
+    <p:sldId id="303" r:id="rId29"/>
+    <p:sldId id="304" r:id="rId30"/>
+    <p:sldId id="305" r:id="rId31"/>
+    <p:sldId id="318" r:id="rId32"/>
+    <p:sldId id="295" r:id="rId33"/>
+    <p:sldId id="296" r:id="rId34"/>
+    <p:sldId id="297" r:id="rId35"/>
+    <p:sldId id="298" r:id="rId36"/>
+    <p:sldId id="310" r:id="rId37"/>
+    <p:sldId id="319" r:id="rId38"/>
   </p:sldIdLst>
   <p:sldSz cx="9144000" cy="6858000" type="screen4x3"/>
   <p:notesSz cx="6858000" cy="9144000"/>
@@ -175,9 +178,11 @@
         </p14:section>
         <p14:section name="Setting Up The API : Model &amp; Controller" id="{8A11717A-0837-49E8-8B55-CE34202079A4}">
           <p14:sldIdLst>
+            <p14:sldId id="312"/>
             <p14:sldId id="270"/>
-            <p14:sldId id="312"/>
             <p14:sldId id="271"/>
+            <p14:sldId id="315"/>
+            <p14:sldId id="316"/>
             <p14:sldId id="272"/>
           </p14:sldIdLst>
         </p14:section>
@@ -192,16 +197,17 @@
             <p14:sldId id="303"/>
             <p14:sldId id="304"/>
             <p14:sldId id="305"/>
-            <p14:sldId id="306"/>
           </p14:sldIdLst>
         </p14:section>
         <p14:section name="Focus : Validation Pipeline" id="{110F06E4-9541-41BF-A977-FE000F327D42}">
           <p14:sldIdLst>
+            <p14:sldId id="318"/>
             <p14:sldId id="295"/>
             <p14:sldId id="296"/>
             <p14:sldId id="297"/>
             <p14:sldId id="298"/>
             <p14:sldId id="310"/>
+            <p14:sldId id="319"/>
           </p14:sldIdLst>
         </p14:section>
       </p14:sectionLst>
@@ -306,7 +312,7 @@
           <a:p>
             <a:fld id="{85A73860-D32E-244F-97E2-8B44A1E732EA}" type="datetimeFigureOut">
               <a:rPr lang="en-US" smtClean="0"/>
-              <a:t>9/30/2015</a:t>
+              <a:t>10/1/2015</a:t>
             </a:fld>
             <a:endParaRPr lang="en-US"/>
           </a:p>
@@ -472,7 +478,7 @@
           <a:p>
             <a:fld id="{CFDCE18C-82BF-7049-907F-A04F522C5D10}" type="datetimeFigureOut">
               <a:rPr lang="en-US" smtClean="0"/>
-              <a:t>9/30/2015</a:t>
+              <a:t>10/1/2015</a:t>
             </a:fld>
             <a:endParaRPr lang="en-US"/>
           </a:p>
@@ -946,7 +952,7 @@
           <a:p>
             <a:fld id="{211E60AA-BB90-2D4E-9A05-9F2EA4A5745D}" type="datetime1">
               <a:rPr lang="en-GB" smtClean="0"/>
-              <a:t>30/09/2015</a:t>
+              <a:t>01/10/2015</a:t>
             </a:fld>
             <a:endParaRPr lang="en-US"/>
           </a:p>
@@ -1138,7 +1144,7 @@
           <a:p>
             <a:fld id="{AF7D99CB-36F9-AB44-9935-E8E81BCCE163}" type="datetime1">
               <a:rPr lang="en-GB" smtClean="0"/>
-              <a:t>30/09/2015</a:t>
+              <a:t>01/10/2015</a:t>
             </a:fld>
             <a:endParaRPr lang="en-US"/>
           </a:p>
@@ -1318,7 +1324,7 @@
           <a:p>
             <a:fld id="{40894566-D766-7C44-A74C-F71343F76073}" type="datetime1">
               <a:rPr lang="en-GB" smtClean="0"/>
-              <a:t>30/09/2015</a:t>
+              <a:t>01/10/2015</a:t>
             </a:fld>
             <a:endParaRPr lang="en-US"/>
           </a:p>
@@ -1425,7 +1431,7 @@
           <a:p>
             <a:fld id="{19645601-E4D8-6547-95D6-5833634BAB18}" type="datetime1">
               <a:rPr lang="en-GB" smtClean="0"/>
-              <a:t>30/09/2015</a:t>
+              <a:t>01/10/2015</a:t>
             </a:fld>
             <a:endParaRPr lang="en-US" dirty="0"/>
           </a:p>
@@ -1596,7 +1602,7 @@
           <a:p>
             <a:fld id="{B1DD997D-4F80-2742-BD8E-A81BAF896594}" type="datetime1">
               <a:rPr lang="en-GB" smtClean="0"/>
-              <a:t>30/09/2015</a:t>
+              <a:t>01/10/2015</a:t>
             </a:fld>
             <a:endParaRPr lang="en-US"/>
           </a:p>
@@ -1863,7 +1869,7 @@
             <a:fld id="{09094B57-6F4F-C84F-86E1-73956807D9DF}" type="datetime1">
               <a:rPr lang="en-GB" smtClean="0"/>
               <a:pPr/>
-              <a:t>30/09/2015</a:t>
+              <a:t>01/10/2015</a:t>
             </a:fld>
             <a:endParaRPr lang="en-US"/>
           </a:p>
@@ -2172,7 +2178,7 @@
           <a:p>
             <a:fld id="{8BF8174A-0B94-EF49-B569-F19DD9CB493C}" type="datetime1">
               <a:rPr lang="en-GB" smtClean="0"/>
-              <a:t>30/09/2015</a:t>
+              <a:t>01/10/2015</a:t>
             </a:fld>
             <a:endParaRPr lang="en-US"/>
           </a:p>
@@ -2602,7 +2608,7 @@
           <a:p>
             <a:fld id="{6BF7AF84-2502-9142-B142-8EBE4A2BD6BF}" type="datetime1">
               <a:rPr lang="en-GB" smtClean="0"/>
-              <a:t>30/09/2015</a:t>
+              <a:t>01/10/2015</a:t>
             </a:fld>
             <a:endParaRPr lang="en-US"/>
           </a:p>
@@ -2720,7 +2726,7 @@
           <a:p>
             <a:fld id="{29C625B6-99A9-D24B-948A-1AAA6A59D495}" type="datetime1">
               <a:rPr lang="en-GB" smtClean="0"/>
-              <a:t>30/09/2015</a:t>
+              <a:t>01/10/2015</a:t>
             </a:fld>
             <a:endParaRPr lang="en-US"/>
           </a:p>
@@ -2815,7 +2821,7 @@
           <a:p>
             <a:fld id="{235BD852-90AC-454D-980C-117C9815F7E0}" type="datetime1">
               <a:rPr lang="en-GB" smtClean="0"/>
-              <a:t>30/09/2015</a:t>
+              <a:t>01/10/2015</a:t>
             </a:fld>
             <a:endParaRPr lang="en-US"/>
           </a:p>
@@ -3094,7 +3100,7 @@
           <a:p>
             <a:fld id="{48152422-C06B-104C-AD1B-B033BDE2D553}" type="datetime1">
               <a:rPr lang="en-GB" smtClean="0"/>
-              <a:t>30/09/2015</a:t>
+              <a:t>01/10/2015</a:t>
             </a:fld>
             <a:endParaRPr lang="en-US"/>
           </a:p>
@@ -3351,7 +3357,7 @@
           <a:p>
             <a:fld id="{D0D5B1A1-94F8-094F-B5B1-BB11631897C9}" type="datetime1">
               <a:rPr lang="en-GB" smtClean="0"/>
-              <a:t>30/09/2015</a:t>
+              <a:t>01/10/2015</a:t>
             </a:fld>
             <a:endParaRPr lang="en-US"/>
           </a:p>
@@ -3572,7 +3578,7 @@
           <a:p>
             <a:fld id="{C918891B-6F3F-7A4F-88DD-48D206AC848E}" type="datetime1">
               <a:rPr lang="en-GB" smtClean="0"/>
-              <a:t>30/09/2015</a:t>
+              <a:t>01/10/2015</a:t>
             </a:fld>
             <a:endParaRPr lang="en-US" dirty="0"/>
           </a:p>
@@ -4100,15 +4106,7 @@
             </a:pPr>
             <a:r>
               <a:rPr lang="en-US" sz="2800" dirty="0" smtClean="0"/>
-              <a:t>Front End </a:t>
-            </a:r>
-            <a:r>
-              <a:rPr lang="en-US" sz="2800" dirty="0" smtClean="0"/>
-              <a:t>guys / API clients prefer consistent </a:t>
-            </a:r>
-            <a:r>
-              <a:rPr lang="en-US" sz="2800" dirty="0" smtClean="0"/>
-              <a:t>data</a:t>
+              <a:t>Front End guys / API clients prefer consistent data</a:t>
             </a:r>
           </a:p>
           <a:p>
@@ -4254,7 +4252,6 @@
               <a:rPr lang="en-US" sz="2800" dirty="0" smtClean="0"/>
               <a:t>They probably want some validation details</a:t>
             </a:r>
-            <a:endParaRPr lang="en-US" sz="2800" dirty="0" smtClean="0"/>
           </a:p>
           <a:p>
             <a:pPr marL="0" indent="0">
@@ -4420,15 +4417,7 @@
             </a:pPr>
             <a:r>
               <a:rPr lang="en-US" sz="2800" dirty="0" smtClean="0"/>
-              <a:t>We will set 3 main types of </a:t>
-            </a:r>
-            <a:r>
-              <a:rPr lang="en-US" sz="2800" dirty="0" smtClean="0"/>
-              <a:t>exceptions</a:t>
-            </a:r>
-            <a:r>
-              <a:rPr lang="en-US" sz="2800" dirty="0" smtClean="0"/>
-              <a:t>, based on 3 error scenarios</a:t>
+              <a:t>We will set 3 main types of exceptions, based on 3 error scenarios</a:t>
             </a:r>
           </a:p>
           <a:p>
@@ -4664,8 +4653,9 @@
             </a:pPr>
             <a:r>
               <a:rPr lang="en-US" sz="2800" dirty="0" smtClean="0"/>
-              <a:t>For client errors, there are two cases </a:t>
-            </a:r>
+              <a:t>Client errors :</a:t>
+            </a:r>
+            <a:endParaRPr lang="en-US" sz="2800" dirty="0" smtClean="0"/>
           </a:p>
           <a:p>
             <a:pPr>
@@ -5128,8 +5118,8 @@
               <a:buNone/>
             </a:pPr>
             <a:r>
-              <a:rPr lang="en-US" sz="2800" dirty="0" smtClean="0"/>
-              <a:t>For client errors, there are two cases </a:t>
+              <a:rPr lang="en-US" sz="2800" dirty="0"/>
+              <a:t>Client errors :</a:t>
             </a:r>
           </a:p>
           <a:p>
@@ -5139,7 +5129,11 @@
             </a:pPr>
             <a:r>
               <a:rPr lang="en-US" sz="2800" dirty="0" smtClean="0"/>
-              <a:t>Business errors</a:t>
+              <a:t>Business/Service </a:t>
+            </a:r>
+            <a:r>
+              <a:rPr lang="en-US" sz="2800" dirty="0" smtClean="0"/>
+              <a:t>errors</a:t>
             </a:r>
           </a:p>
         </p:txBody>
@@ -5814,6 +5808,100 @@
           <a:chExt cx="0" cy="0"/>
         </a:xfrm>
       </p:grpSpPr>
+      <p:sp>
+        <p:nvSpPr>
+          <p:cNvPr id="2" name="Title 1"/>
+          <p:cNvSpPr>
+            <a:spLocks noGrp="1"/>
+          </p:cNvSpPr>
+          <p:nvPr>
+            <p:ph type="title"/>
+          </p:nvPr>
+        </p:nvSpPr>
+        <p:spPr>
+          <a:xfrm>
+            <a:off x="778476" y="3264973"/>
+            <a:ext cx="8229600" cy="545544"/>
+          </a:xfrm>
+        </p:spPr>
+        <p:txBody>
+          <a:bodyPr>
+            <a:noAutofit/>
+          </a:bodyPr>
+          <a:lstStyle/>
+          <a:p>
+            <a:pPr algn="ctr"/>
+            <a:r>
+              <a:rPr lang="fr-FR" sz="3600" dirty="0" smtClean="0"/>
+              <a:t>Setting up the API</a:t>
+            </a:r>
+            <a:br>
+              <a:rPr lang="fr-FR" sz="3600" dirty="0" smtClean="0"/>
+            </a:br>
+            <a:r>
+              <a:rPr lang="fr-FR" sz="3600" dirty="0" smtClean="0"/>
+              <a:t>-</a:t>
+            </a:r>
+            <a:r>
+              <a:rPr lang="fr-FR" sz="3600" dirty="0"/>
+              <a:t/>
+            </a:r>
+            <a:br>
+              <a:rPr lang="fr-FR" sz="3600" dirty="0"/>
+            </a:br>
+            <a:r>
+              <a:rPr lang="fr-FR" sz="3600" dirty="0" err="1" smtClean="0"/>
+              <a:t>Models</a:t>
+            </a:r>
+            <a:r>
+              <a:rPr lang="fr-FR" sz="3600" dirty="0" smtClean="0"/>
+              <a:t> &amp; </a:t>
+            </a:r>
+            <a:r>
+              <a:rPr lang="fr-FR" sz="3600" dirty="0" err="1" smtClean="0"/>
+              <a:t>Controllers</a:t>
+            </a:r>
+            <a:endParaRPr lang="fr-FR" sz="3600" dirty="0"/>
+          </a:p>
+        </p:txBody>
+      </p:sp>
+    </p:spTree>
+    <p:extLst>
+      <p:ext uri="{BB962C8B-B14F-4D97-AF65-F5344CB8AC3E}">
+        <p14:creationId xmlns:p14="http://schemas.microsoft.com/office/powerpoint/2010/main" val="4249304921"/>
+      </p:ext>
+    </p:extLst>
+  </p:cSld>
+  <p:clrMapOvr>
+    <a:masterClrMapping/>
+  </p:clrMapOvr>
+  <p:timing>
+    <p:tnLst>
+      <p:par>
+        <p:cTn id="1" dur="indefinite" restart="never" nodeType="tmRoot"/>
+      </p:par>
+    </p:tnLst>
+  </p:timing>
+</p:sld>
+</file>
+
+<file path=ppt/slides/slide17.xml><?xml version="1.0" encoding="utf-8"?>
+<p:sld xmlns:a="http://schemas.openxmlformats.org/drawingml/2006/main" xmlns:r="http://schemas.openxmlformats.org/officeDocument/2006/relationships" xmlns:p="http://schemas.openxmlformats.org/presentationml/2006/main">
+  <p:cSld>
+    <p:spTree>
+      <p:nvGrpSpPr>
+        <p:cNvPr id="1" name=""/>
+        <p:cNvGrpSpPr/>
+        <p:nvPr/>
+      </p:nvGrpSpPr>
+      <p:grpSpPr>
+        <a:xfrm>
+          <a:off x="0" y="0"/>
+          <a:ext cx="0" cy="0"/>
+          <a:chOff x="0" y="0"/>
+          <a:chExt cx="0" cy="0"/>
+        </a:xfrm>
+      </p:grpSpPr>
       <p:pic>
         <p:nvPicPr>
           <p:cNvPr id="7" name="Picture 6"/>
@@ -6057,100 +6145,6 @@
 </p:sld>
 </file>
 
-<file path=ppt/slides/slide17.xml><?xml version="1.0" encoding="utf-8"?>
-<p:sld xmlns:a="http://schemas.openxmlformats.org/drawingml/2006/main" xmlns:r="http://schemas.openxmlformats.org/officeDocument/2006/relationships" xmlns:p="http://schemas.openxmlformats.org/presentationml/2006/main">
-  <p:cSld>
-    <p:spTree>
-      <p:nvGrpSpPr>
-        <p:cNvPr id="1" name=""/>
-        <p:cNvGrpSpPr/>
-        <p:nvPr/>
-      </p:nvGrpSpPr>
-      <p:grpSpPr>
-        <a:xfrm>
-          <a:off x="0" y="0"/>
-          <a:ext cx="0" cy="0"/>
-          <a:chOff x="0" y="0"/>
-          <a:chExt cx="0" cy="0"/>
-        </a:xfrm>
-      </p:grpSpPr>
-      <p:sp>
-        <p:nvSpPr>
-          <p:cNvPr id="2" name="Title 1"/>
-          <p:cNvSpPr>
-            <a:spLocks noGrp="1"/>
-          </p:cNvSpPr>
-          <p:nvPr>
-            <p:ph type="title"/>
-          </p:nvPr>
-        </p:nvSpPr>
-        <p:spPr>
-          <a:xfrm>
-            <a:off x="778476" y="3264973"/>
-            <a:ext cx="8229600" cy="545544"/>
-          </a:xfrm>
-        </p:spPr>
-        <p:txBody>
-          <a:bodyPr>
-            <a:noAutofit/>
-          </a:bodyPr>
-          <a:lstStyle/>
-          <a:p>
-            <a:pPr algn="ctr"/>
-            <a:r>
-              <a:rPr lang="fr-FR" sz="3600" dirty="0" smtClean="0"/>
-              <a:t>Setting up the API</a:t>
-            </a:r>
-            <a:br>
-              <a:rPr lang="fr-FR" sz="3600" dirty="0" smtClean="0"/>
-            </a:br>
-            <a:r>
-              <a:rPr lang="fr-FR" sz="3600" dirty="0" smtClean="0"/>
-              <a:t>-</a:t>
-            </a:r>
-            <a:r>
-              <a:rPr lang="fr-FR" sz="3600" dirty="0"/>
-              <a:t/>
-            </a:r>
-            <a:br>
-              <a:rPr lang="fr-FR" sz="3600" dirty="0"/>
-            </a:br>
-            <a:r>
-              <a:rPr lang="fr-FR" sz="3600" dirty="0" err="1" smtClean="0"/>
-              <a:t>Models</a:t>
-            </a:r>
-            <a:r>
-              <a:rPr lang="fr-FR" sz="3600" dirty="0" smtClean="0"/>
-              <a:t> &amp; </a:t>
-            </a:r>
-            <a:r>
-              <a:rPr lang="fr-FR" sz="3600" dirty="0" err="1" smtClean="0"/>
-              <a:t>Controllers</a:t>
-            </a:r>
-            <a:endParaRPr lang="fr-FR" sz="3600" dirty="0"/>
-          </a:p>
-        </p:txBody>
-      </p:sp>
-    </p:spTree>
-    <p:extLst>
-      <p:ext uri="{BB962C8B-B14F-4D97-AF65-F5344CB8AC3E}">
-        <p14:creationId xmlns:p14="http://schemas.microsoft.com/office/powerpoint/2010/main" val="4249304921"/>
-      </p:ext>
-    </p:extLst>
-  </p:cSld>
-  <p:clrMapOvr>
-    <a:masterClrMapping/>
-  </p:clrMapOvr>
-  <p:timing>
-    <p:tnLst>
-      <p:par>
-        <p:cTn id="1" dur="indefinite" restart="never" nodeType="tmRoot"/>
-      </p:par>
-    </p:tnLst>
-  </p:timing>
-</p:sld>
-</file>
-
 <file path=ppt/slides/slide18.xml><?xml version="1.0" encoding="utf-8"?>
 <p:sld xmlns:a="http://schemas.openxmlformats.org/drawingml/2006/main" xmlns:r="http://schemas.openxmlformats.org/officeDocument/2006/relationships" xmlns:p="http://schemas.openxmlformats.org/presentationml/2006/main">
   <p:cSld>
@@ -6341,6 +6335,479 @@
 </file>
 
 <file path=ppt/slides/slide19.xml><?xml version="1.0" encoding="utf-8"?>
+<p:sld xmlns:a="http://schemas.openxmlformats.org/drawingml/2006/main" xmlns:r="http://schemas.openxmlformats.org/officeDocument/2006/relationships" xmlns:p="http://schemas.openxmlformats.org/presentationml/2006/main">
+  <p:cSld>
+    <p:spTree>
+      <p:nvGrpSpPr>
+        <p:cNvPr id="1" name=""/>
+        <p:cNvGrpSpPr/>
+        <p:nvPr/>
+      </p:nvGrpSpPr>
+      <p:grpSpPr>
+        <a:xfrm>
+          <a:off x="0" y="0"/>
+          <a:ext cx="0" cy="0"/>
+          <a:chOff x="0" y="0"/>
+          <a:chExt cx="0" cy="0"/>
+        </a:xfrm>
+      </p:grpSpPr>
+      <p:sp>
+        <p:nvSpPr>
+          <p:cNvPr id="2" name="Title 1"/>
+          <p:cNvSpPr>
+            <a:spLocks noGrp="1"/>
+          </p:cNvSpPr>
+          <p:nvPr>
+            <p:ph type="title"/>
+          </p:nvPr>
+        </p:nvSpPr>
+        <p:spPr/>
+        <p:txBody>
+          <a:bodyPr/>
+          <a:lstStyle/>
+          <a:p>
+            <a:r>
+              <a:rPr lang="en-US" dirty="0" smtClean="0"/>
+              <a:t>Setting up the API : model attributes</a:t>
+            </a:r>
+            <a:endParaRPr lang="fr-FR" dirty="0"/>
+          </a:p>
+        </p:txBody>
+      </p:sp>
+      <p:pic>
+        <p:nvPicPr>
+          <p:cNvPr id="4" name="Picture 3"/>
+          <p:cNvPicPr>
+            <a:picLocks noChangeAspect="1"/>
+          </p:cNvPicPr>
+          <p:nvPr/>
+        </p:nvPicPr>
+        <p:blipFill>
+          <a:blip r:embed="rId2"/>
+          <a:stretch>
+            <a:fillRect/>
+          </a:stretch>
+        </p:blipFill>
+        <p:spPr>
+          <a:xfrm>
+            <a:off x="457200" y="1369974"/>
+            <a:ext cx="2409825" cy="4695825"/>
+          </a:xfrm>
+          <a:prstGeom prst="rect">
+            <a:avLst/>
+          </a:prstGeom>
+        </p:spPr>
+      </p:pic>
+      <p:sp>
+        <p:nvSpPr>
+          <p:cNvPr id="5" name="Rounded Rectangle 4"/>
+          <p:cNvSpPr/>
+          <p:nvPr/>
+        </p:nvSpPr>
+        <p:spPr>
+          <a:xfrm>
+            <a:off x="663144" y="5097092"/>
+            <a:ext cx="1626975" cy="282227"/>
+          </a:xfrm>
+          <a:prstGeom prst="roundRect">
+            <a:avLst/>
+          </a:prstGeom>
+          <a:noFill/>
+          <a:ln/>
+        </p:spPr>
+        <p:style>
+          <a:lnRef idx="2">
+            <a:schemeClr val="accent6"/>
+          </a:lnRef>
+          <a:fillRef idx="1">
+            <a:schemeClr val="lt1"/>
+          </a:fillRef>
+          <a:effectRef idx="0">
+            <a:schemeClr val="accent6"/>
+          </a:effectRef>
+          <a:fontRef idx="minor">
+            <a:schemeClr val="dk1"/>
+          </a:fontRef>
+        </p:style>
+        <p:txBody>
+          <a:bodyPr rot="0" spcFirstLastPara="0" vertOverflow="overflow" horzOverflow="overflow" vert="horz" wrap="square" lIns="91440" tIns="45720" rIns="91440" bIns="45720" numCol="1" spcCol="0" rtlCol="0" fromWordArt="0" anchor="ctr" anchorCtr="0" forceAA="0" compatLnSpc="1">
+            <a:prstTxWarp prst="textNoShape">
+              <a:avLst/>
+            </a:prstTxWarp>
+            <a:noAutofit/>
+          </a:bodyPr>
+          <a:lstStyle/>
+          <a:p>
+            <a:pPr algn="ctr"/>
+            <a:endParaRPr lang="fr-FR"/>
+          </a:p>
+        </p:txBody>
+      </p:sp>
+      <p:pic>
+        <p:nvPicPr>
+          <p:cNvPr id="6" name="Picture 5"/>
+          <p:cNvPicPr>
+            <a:picLocks noChangeAspect="1"/>
+          </p:cNvPicPr>
+          <p:nvPr/>
+        </p:nvPicPr>
+        <p:blipFill>
+          <a:blip r:embed="rId3"/>
+          <a:stretch>
+            <a:fillRect/>
+          </a:stretch>
+        </p:blipFill>
+        <p:spPr>
+          <a:xfrm>
+            <a:off x="3265016" y="2117686"/>
+            <a:ext cx="5200650" cy="3200400"/>
+          </a:xfrm>
+          <a:prstGeom prst="rect">
+            <a:avLst/>
+          </a:prstGeom>
+        </p:spPr>
+      </p:pic>
+    </p:spTree>
+    <p:extLst>
+      <p:ext uri="{BB962C8B-B14F-4D97-AF65-F5344CB8AC3E}">
+        <p14:creationId xmlns:p14="http://schemas.microsoft.com/office/powerpoint/2010/main" val="1236533095"/>
+      </p:ext>
+    </p:extLst>
+  </p:cSld>
+  <p:clrMapOvr>
+    <a:masterClrMapping/>
+  </p:clrMapOvr>
+</p:sld>
+</file>
+
+<file path=ppt/slides/slide2.xml><?xml version="1.0" encoding="utf-8"?>
+<p:sld xmlns:a="http://schemas.openxmlformats.org/drawingml/2006/main" xmlns:r="http://schemas.openxmlformats.org/officeDocument/2006/relationships" xmlns:p="http://schemas.openxmlformats.org/presentationml/2006/main">
+  <p:cSld>
+    <p:spTree>
+      <p:nvGrpSpPr>
+        <p:cNvPr id="1" name=""/>
+        <p:cNvGrpSpPr/>
+        <p:nvPr/>
+      </p:nvGrpSpPr>
+      <p:grpSpPr>
+        <a:xfrm>
+          <a:off x="0" y="0"/>
+          <a:ext cx="0" cy="0"/>
+          <a:chOff x="0" y="0"/>
+          <a:chExt cx="0" cy="0"/>
+        </a:xfrm>
+      </p:grpSpPr>
+      <p:sp>
+        <p:nvSpPr>
+          <p:cNvPr id="2" name="TextBox 1"/>
+          <p:cNvSpPr txBox="1"/>
+          <p:nvPr/>
+        </p:nvSpPr>
+        <p:spPr>
+          <a:xfrm>
+            <a:off x="533951" y="906162"/>
+            <a:ext cx="8478603" cy="4524315"/>
+          </a:xfrm>
+          <a:prstGeom prst="rect">
+            <a:avLst/>
+          </a:prstGeom>
+          <a:noFill/>
+        </p:spPr>
+        <p:txBody>
+          <a:bodyPr wrap="none" rtlCol="0">
+            <a:spAutoFit/>
+          </a:bodyPr>
+          <a:lstStyle/>
+          <a:p>
+            <a:pPr marL="400050" indent="-400050">
+              <a:buAutoNum type="romanUcPeriod"/>
+            </a:pPr>
+            <a:r>
+              <a:rPr lang="fr-FR" sz="3200" dirty="0" err="1" smtClean="0">
+                <a:latin typeface="Century Gothic"/>
+                <a:cs typeface="Century Gothic"/>
+              </a:rPr>
+              <a:t>Errors</a:t>
+            </a:r>
+            <a:r>
+              <a:rPr lang="fr-FR" sz="3200" dirty="0" smtClean="0">
+                <a:latin typeface="Century Gothic"/>
+                <a:cs typeface="Century Gothic"/>
+              </a:rPr>
+              <a:t> ?</a:t>
+            </a:r>
+          </a:p>
+          <a:p>
+            <a:pPr marL="400050" indent="-400050">
+              <a:buAutoNum type="romanUcPeriod"/>
+            </a:pPr>
+            <a:endParaRPr lang="fr-FR" sz="3200" dirty="0" smtClean="0">
+              <a:latin typeface="Century Gothic"/>
+              <a:cs typeface="Century Gothic"/>
+            </a:endParaRPr>
+          </a:p>
+          <a:p>
+            <a:pPr marL="400050" indent="-400050">
+              <a:buAutoNum type="romanUcPeriod"/>
+            </a:pPr>
+            <a:r>
+              <a:rPr lang="fr-FR" sz="3200" dirty="0" err="1" smtClean="0">
+                <a:latin typeface="Century Gothic"/>
+                <a:cs typeface="Century Gothic"/>
+              </a:rPr>
+              <a:t>Error</a:t>
+            </a:r>
+            <a:r>
+              <a:rPr lang="fr-FR" sz="3200" dirty="0" smtClean="0">
+                <a:latin typeface="Century Gothic"/>
+                <a:cs typeface="Century Gothic"/>
+              </a:rPr>
+              <a:t> </a:t>
+            </a:r>
+            <a:r>
+              <a:rPr lang="fr-FR" sz="3200" dirty="0" err="1" smtClean="0">
+                <a:latin typeface="Century Gothic"/>
+                <a:cs typeface="Century Gothic"/>
+              </a:rPr>
+              <a:t>specification</a:t>
+            </a:r>
+            <a:endParaRPr lang="fr-FR" sz="3200" dirty="0" smtClean="0">
+              <a:latin typeface="Century Gothic"/>
+              <a:cs typeface="Century Gothic"/>
+            </a:endParaRPr>
+          </a:p>
+          <a:p>
+            <a:pPr marL="400050" indent="-400050">
+              <a:buAutoNum type="romanUcPeriod"/>
+            </a:pPr>
+            <a:endParaRPr lang="fr-FR" sz="3200" dirty="0" smtClean="0">
+              <a:latin typeface="Century Gothic"/>
+              <a:cs typeface="Century Gothic"/>
+            </a:endParaRPr>
+          </a:p>
+          <a:p>
+            <a:pPr marL="400050" indent="-400050">
+              <a:buAutoNum type="romanUcPeriod"/>
+            </a:pPr>
+            <a:r>
+              <a:rPr lang="en-US" sz="3200" dirty="0" smtClean="0">
+                <a:latin typeface="Century Gothic"/>
+                <a:cs typeface="Century Gothic"/>
+              </a:rPr>
+              <a:t> Setting up the API : Models &amp; Controller</a:t>
+            </a:r>
+          </a:p>
+          <a:p>
+            <a:pPr marL="400050" indent="-400050">
+              <a:buAutoNum type="romanUcPeriod"/>
+            </a:pPr>
+            <a:endParaRPr lang="en-US" sz="3200" dirty="0" smtClean="0">
+              <a:latin typeface="Century Gothic"/>
+              <a:cs typeface="Century Gothic"/>
+            </a:endParaRPr>
+          </a:p>
+          <a:p>
+            <a:pPr marL="400050" indent="-400050">
+              <a:buAutoNum type="romanUcPeriod"/>
+            </a:pPr>
+            <a:r>
+              <a:rPr lang="en-US" sz="3200" dirty="0" smtClean="0">
+                <a:latin typeface="Century Gothic"/>
+                <a:cs typeface="Century Gothic"/>
+              </a:rPr>
+              <a:t> Throwing and Catching</a:t>
+            </a:r>
+          </a:p>
+          <a:p>
+            <a:pPr marL="400050" indent="-400050">
+              <a:buAutoNum type="romanUcPeriod"/>
+            </a:pPr>
+            <a:endParaRPr lang="fr-FR" sz="3200" dirty="0" smtClean="0">
+              <a:latin typeface="Century Gothic"/>
+              <a:cs typeface="Century Gothic"/>
+            </a:endParaRPr>
+          </a:p>
+          <a:p>
+            <a:pPr marL="400050" indent="-400050">
+              <a:buAutoNum type="romanUcPeriod"/>
+            </a:pPr>
+            <a:r>
+              <a:rPr lang="fr-FR" sz="3200" dirty="0" smtClean="0">
+                <a:latin typeface="Century Gothic"/>
+                <a:cs typeface="Century Gothic"/>
+              </a:rPr>
+              <a:t> Validation Pipeline</a:t>
+            </a:r>
+          </a:p>
+        </p:txBody>
+      </p:sp>
+    </p:spTree>
+    <p:extLst>
+      <p:ext uri="{BB962C8B-B14F-4D97-AF65-F5344CB8AC3E}">
+        <p14:creationId xmlns:p14="http://schemas.microsoft.com/office/powerpoint/2010/main" val="2469234875"/>
+      </p:ext>
+    </p:extLst>
+  </p:cSld>
+  <p:clrMapOvr>
+    <a:masterClrMapping/>
+  </p:clrMapOvr>
+  <p:timing>
+    <p:tnLst>
+      <p:par>
+        <p:cTn id="1" dur="indefinite" restart="never" nodeType="tmRoot"/>
+      </p:par>
+    </p:tnLst>
+  </p:timing>
+</p:sld>
+</file>
+
+<file path=ppt/slides/slide20.xml><?xml version="1.0" encoding="utf-8"?>
+<p:sld xmlns:a="http://schemas.openxmlformats.org/drawingml/2006/main" xmlns:r="http://schemas.openxmlformats.org/officeDocument/2006/relationships" xmlns:p="http://schemas.openxmlformats.org/presentationml/2006/main">
+  <p:cSld>
+    <p:spTree>
+      <p:nvGrpSpPr>
+        <p:cNvPr id="1" name=""/>
+        <p:cNvGrpSpPr/>
+        <p:nvPr/>
+      </p:nvGrpSpPr>
+      <p:grpSpPr>
+        <a:xfrm>
+          <a:off x="0" y="0"/>
+          <a:ext cx="0" cy="0"/>
+          <a:chOff x="0" y="0"/>
+          <a:chExt cx="0" cy="0"/>
+        </a:xfrm>
+      </p:grpSpPr>
+      <p:sp>
+        <p:nvSpPr>
+          <p:cNvPr id="2" name="Title 1"/>
+          <p:cNvSpPr>
+            <a:spLocks noGrp="1"/>
+          </p:cNvSpPr>
+          <p:nvPr>
+            <p:ph type="title"/>
+          </p:nvPr>
+        </p:nvSpPr>
+        <p:spPr/>
+        <p:txBody>
+          <a:bodyPr/>
+          <a:lstStyle/>
+          <a:p>
+            <a:r>
+              <a:rPr lang="en-US" dirty="0" smtClean="0"/>
+              <a:t>Setting up the API : model attributes</a:t>
+            </a:r>
+            <a:endParaRPr lang="fr-FR" dirty="0"/>
+          </a:p>
+        </p:txBody>
+      </p:sp>
+      <p:pic>
+        <p:nvPicPr>
+          <p:cNvPr id="4" name="Picture 3"/>
+          <p:cNvPicPr>
+            <a:picLocks noChangeAspect="1"/>
+          </p:cNvPicPr>
+          <p:nvPr/>
+        </p:nvPicPr>
+        <p:blipFill>
+          <a:blip r:embed="rId2"/>
+          <a:stretch>
+            <a:fillRect/>
+          </a:stretch>
+        </p:blipFill>
+        <p:spPr>
+          <a:xfrm>
+            <a:off x="457200" y="1369974"/>
+            <a:ext cx="2409825" cy="4695825"/>
+          </a:xfrm>
+          <a:prstGeom prst="rect">
+            <a:avLst/>
+          </a:prstGeom>
+        </p:spPr>
+      </p:pic>
+      <p:sp>
+        <p:nvSpPr>
+          <p:cNvPr id="5" name="Rounded Rectangle 4"/>
+          <p:cNvSpPr/>
+          <p:nvPr/>
+        </p:nvSpPr>
+        <p:spPr>
+          <a:xfrm>
+            <a:off x="663144" y="5097092"/>
+            <a:ext cx="1626975" cy="282227"/>
+          </a:xfrm>
+          <a:prstGeom prst="roundRect">
+            <a:avLst/>
+          </a:prstGeom>
+          <a:noFill/>
+          <a:ln/>
+        </p:spPr>
+        <p:style>
+          <a:lnRef idx="2">
+            <a:schemeClr val="accent6"/>
+          </a:lnRef>
+          <a:fillRef idx="1">
+            <a:schemeClr val="lt1"/>
+          </a:fillRef>
+          <a:effectRef idx="0">
+            <a:schemeClr val="accent6"/>
+          </a:effectRef>
+          <a:fontRef idx="minor">
+            <a:schemeClr val="dk1"/>
+          </a:fontRef>
+        </p:style>
+        <p:txBody>
+          <a:bodyPr rot="0" spcFirstLastPara="0" vertOverflow="overflow" horzOverflow="overflow" vert="horz" wrap="square" lIns="91440" tIns="45720" rIns="91440" bIns="45720" numCol="1" spcCol="0" rtlCol="0" fromWordArt="0" anchor="ctr" anchorCtr="0" forceAA="0" compatLnSpc="1">
+            <a:prstTxWarp prst="textNoShape">
+              <a:avLst/>
+            </a:prstTxWarp>
+            <a:noAutofit/>
+          </a:bodyPr>
+          <a:lstStyle/>
+          <a:p>
+            <a:pPr algn="ctr"/>
+            <a:endParaRPr lang="fr-FR"/>
+          </a:p>
+        </p:txBody>
+      </p:sp>
+      <p:pic>
+        <p:nvPicPr>
+          <p:cNvPr id="7" name="Picture 6"/>
+          <p:cNvPicPr>
+            <a:picLocks noChangeAspect="1"/>
+          </p:cNvPicPr>
+          <p:nvPr/>
+        </p:nvPicPr>
+        <p:blipFill>
+          <a:blip r:embed="rId3"/>
+          <a:stretch>
+            <a:fillRect/>
+          </a:stretch>
+        </p:blipFill>
+        <p:spPr>
+          <a:xfrm>
+            <a:off x="2809103" y="2398048"/>
+            <a:ext cx="6334897" cy="2548904"/>
+          </a:xfrm>
+          <a:prstGeom prst="rect">
+            <a:avLst/>
+          </a:prstGeom>
+        </p:spPr>
+      </p:pic>
+    </p:spTree>
+    <p:extLst>
+      <p:ext uri="{BB962C8B-B14F-4D97-AF65-F5344CB8AC3E}">
+        <p14:creationId xmlns:p14="http://schemas.microsoft.com/office/powerpoint/2010/main" val="2742076686"/>
+      </p:ext>
+    </p:extLst>
+  </p:cSld>
+  <p:clrMapOvr>
+    <a:masterClrMapping/>
+  </p:clrMapOvr>
+</p:sld>
+</file>
+
+<file path=ppt/slides/slide21.xml><?xml version="1.0" encoding="utf-8"?>
 <p:sld xmlns:a="http://schemas.openxmlformats.org/drawingml/2006/main" xmlns:r="http://schemas.openxmlformats.org/officeDocument/2006/relationships" xmlns:p="http://schemas.openxmlformats.org/presentationml/2006/main">
   <p:cSld>
     <p:spTree>
@@ -6617,221 +7084,7 @@
 </p:sld>
 </file>
 
-<file path=ppt/slides/slide2.xml><?xml version="1.0" encoding="utf-8"?>
-<p:sld xmlns:a="http://schemas.openxmlformats.org/drawingml/2006/main" xmlns:r="http://schemas.openxmlformats.org/officeDocument/2006/relationships" xmlns:p="http://schemas.openxmlformats.org/presentationml/2006/main">
-  <p:cSld>
-    <p:spTree>
-      <p:nvGrpSpPr>
-        <p:cNvPr id="1" name=""/>
-        <p:cNvGrpSpPr/>
-        <p:nvPr/>
-      </p:nvGrpSpPr>
-      <p:grpSpPr>
-        <a:xfrm>
-          <a:off x="0" y="0"/>
-          <a:ext cx="0" cy="0"/>
-          <a:chOff x="0" y="0"/>
-          <a:chExt cx="0" cy="0"/>
-        </a:xfrm>
-      </p:grpSpPr>
-      <p:sp>
-        <p:nvSpPr>
-          <p:cNvPr id="2" name="TextBox 1"/>
-          <p:cNvSpPr txBox="1"/>
-          <p:nvPr/>
-        </p:nvSpPr>
-        <p:spPr>
-          <a:xfrm>
-            <a:off x="533951" y="906162"/>
-            <a:ext cx="8478603" cy="4524315"/>
-          </a:xfrm>
-          <a:prstGeom prst="rect">
-            <a:avLst/>
-          </a:prstGeom>
-          <a:noFill/>
-        </p:spPr>
-        <p:txBody>
-          <a:bodyPr wrap="none" rtlCol="0">
-            <a:spAutoFit/>
-          </a:bodyPr>
-          <a:lstStyle/>
-          <a:p>
-            <a:pPr marL="400050" indent="-400050">
-              <a:buAutoNum type="romanUcPeriod"/>
-            </a:pPr>
-            <a:r>
-              <a:rPr lang="fr-FR" sz="3200" dirty="0" err="1" smtClean="0">
-                <a:latin typeface="Century Gothic"/>
-                <a:cs typeface="Century Gothic"/>
-              </a:rPr>
-              <a:t>Errors</a:t>
-            </a:r>
-            <a:r>
-              <a:rPr lang="fr-FR" sz="3200" dirty="0" smtClean="0">
-                <a:latin typeface="Century Gothic"/>
-                <a:cs typeface="Century Gothic"/>
-              </a:rPr>
-              <a:t> ?</a:t>
-            </a:r>
-          </a:p>
-          <a:p>
-            <a:pPr marL="400050" indent="-400050">
-              <a:buAutoNum type="romanUcPeriod"/>
-            </a:pPr>
-            <a:endParaRPr lang="fr-FR" sz="3200" dirty="0" smtClean="0">
-              <a:latin typeface="Century Gothic"/>
-              <a:cs typeface="Century Gothic"/>
-            </a:endParaRPr>
-          </a:p>
-          <a:p>
-            <a:pPr marL="400050" indent="-400050">
-              <a:buAutoNum type="romanUcPeriod"/>
-            </a:pPr>
-            <a:r>
-              <a:rPr lang="fr-FR" sz="3200" dirty="0" err="1" smtClean="0">
-                <a:latin typeface="Century Gothic"/>
-                <a:cs typeface="Century Gothic"/>
-              </a:rPr>
-              <a:t>Error</a:t>
-            </a:r>
-            <a:r>
-              <a:rPr lang="fr-FR" sz="3200" dirty="0" smtClean="0">
-                <a:latin typeface="Century Gothic"/>
-                <a:cs typeface="Century Gothic"/>
-              </a:rPr>
-              <a:t> </a:t>
-            </a:r>
-            <a:r>
-              <a:rPr lang="fr-FR" sz="3200" dirty="0" err="1" smtClean="0">
-                <a:latin typeface="Century Gothic"/>
-                <a:cs typeface="Century Gothic"/>
-              </a:rPr>
-              <a:t>specification</a:t>
-            </a:r>
-            <a:endParaRPr lang="fr-FR" sz="3200" dirty="0" smtClean="0">
-              <a:latin typeface="Century Gothic"/>
-              <a:cs typeface="Century Gothic"/>
-            </a:endParaRPr>
-          </a:p>
-          <a:p>
-            <a:pPr marL="400050" indent="-400050">
-              <a:buAutoNum type="romanUcPeriod"/>
-            </a:pPr>
-            <a:endParaRPr lang="fr-FR" sz="3200" dirty="0" smtClean="0">
-              <a:latin typeface="Century Gothic"/>
-              <a:cs typeface="Century Gothic"/>
-            </a:endParaRPr>
-          </a:p>
-          <a:p>
-            <a:pPr marL="400050" indent="-400050">
-              <a:buAutoNum type="romanUcPeriod"/>
-            </a:pPr>
-            <a:r>
-              <a:rPr lang="en-US" sz="3200" dirty="0" smtClean="0">
-                <a:latin typeface="Century Gothic"/>
-                <a:cs typeface="Century Gothic"/>
-              </a:rPr>
-              <a:t> Setting up the API </a:t>
-            </a:r>
-            <a:r>
-              <a:rPr lang="en-US" sz="3200" dirty="0" smtClean="0">
-                <a:latin typeface="Century Gothic"/>
-                <a:cs typeface="Century Gothic"/>
-              </a:rPr>
-              <a:t>: Models &amp; Controller</a:t>
-            </a:r>
-            <a:endParaRPr lang="en-US" sz="3200" dirty="0" smtClean="0">
-              <a:latin typeface="Century Gothic"/>
-              <a:cs typeface="Century Gothic"/>
-            </a:endParaRPr>
-          </a:p>
-          <a:p>
-            <a:pPr marL="400050" indent="-400050">
-              <a:buAutoNum type="romanUcPeriod"/>
-            </a:pPr>
-            <a:endParaRPr lang="en-US" sz="3200" dirty="0" smtClean="0">
-              <a:latin typeface="Century Gothic"/>
-              <a:cs typeface="Century Gothic"/>
-            </a:endParaRPr>
-          </a:p>
-          <a:p>
-            <a:pPr marL="400050" indent="-400050">
-              <a:buAutoNum type="romanUcPeriod"/>
-            </a:pPr>
-            <a:r>
-              <a:rPr lang="en-US" sz="3200" dirty="0" smtClean="0">
-                <a:latin typeface="Century Gothic"/>
-                <a:cs typeface="Century Gothic"/>
-              </a:rPr>
-              <a:t> </a:t>
-            </a:r>
-            <a:r>
-              <a:rPr lang="en-US" sz="3200" dirty="0" smtClean="0">
-                <a:latin typeface="Century Gothic"/>
-                <a:cs typeface="Century Gothic"/>
-              </a:rPr>
-              <a:t>Throwing and Catching</a:t>
-            </a:r>
-            <a:endParaRPr lang="en-US" sz="3200" dirty="0" smtClean="0">
-              <a:latin typeface="Century Gothic"/>
-              <a:cs typeface="Century Gothic"/>
-            </a:endParaRPr>
-          </a:p>
-          <a:p>
-            <a:pPr marL="400050" indent="-400050">
-              <a:buAutoNum type="romanUcPeriod"/>
-            </a:pPr>
-            <a:endParaRPr lang="fr-FR" sz="3200" dirty="0" smtClean="0">
-              <a:latin typeface="Century Gothic"/>
-              <a:cs typeface="Century Gothic"/>
-            </a:endParaRPr>
-          </a:p>
-          <a:p>
-            <a:pPr marL="400050" indent="-400050">
-              <a:buAutoNum type="romanUcPeriod"/>
-            </a:pPr>
-            <a:r>
-              <a:rPr lang="fr-FR" sz="3200" dirty="0" smtClean="0">
-                <a:latin typeface="Century Gothic"/>
-                <a:cs typeface="Century Gothic"/>
-              </a:rPr>
-              <a:t> </a:t>
-            </a:r>
-            <a:r>
-              <a:rPr lang="fr-FR" sz="3200" dirty="0" smtClean="0">
-                <a:latin typeface="Century Gothic"/>
-                <a:cs typeface="Century Gothic"/>
-              </a:rPr>
-              <a:t>Validation Pipeline</a:t>
-            </a:r>
-            <a:endParaRPr lang="fr-FR" sz="3200" dirty="0" smtClean="0">
-              <a:latin typeface="Century Gothic"/>
-              <a:cs typeface="Century Gothic"/>
-            </a:endParaRPr>
-          </a:p>
-        </p:txBody>
-      </p:sp>
-    </p:spTree>
-    <p:extLst>
-      <p:ext uri="{BB962C8B-B14F-4D97-AF65-F5344CB8AC3E}">
-        <p14:creationId xmlns:p14="http://schemas.microsoft.com/office/powerpoint/2010/main" val="2469234875"/>
-      </p:ext>
-    </p:extLst>
-  </p:cSld>
-  <p:clrMapOvr>
-    <a:masterClrMapping/>
-  </p:clrMapOvr>
-  <p:timing>
-    <p:tnLst>
-      <p:par>
-        <p:cTn id="1" dur="indefinite" restart="never" nodeType="tmRoot"/>
-      </p:par>
-    </p:tnLst>
-  </p:timing>
-</p:sld>
-</file>
-
-<file path=ppt/slides/slide20.xml><?xml version="1.0" encoding="utf-8"?>
+<file path=ppt/slides/slide22.xml><?xml version="1.0" encoding="utf-8"?>
 <p:sld xmlns:a="http://schemas.openxmlformats.org/drawingml/2006/main" xmlns:r="http://schemas.openxmlformats.org/officeDocument/2006/relationships" xmlns:p="http://schemas.openxmlformats.org/presentationml/2006/main">
   <p:cSld>
     <p:spTree>
@@ -6934,7 +7187,7 @@
 </p:sld>
 </file>
 
-<file path=ppt/slides/slide21.xml><?xml version="1.0" encoding="utf-8"?>
+<file path=ppt/slides/slide23.xml><?xml version="1.0" encoding="utf-8"?>
 <p:sld xmlns:a="http://schemas.openxmlformats.org/drawingml/2006/main" xmlns:r="http://schemas.openxmlformats.org/officeDocument/2006/relationships" xmlns:p="http://schemas.openxmlformats.org/presentationml/2006/main">
   <p:cSld>
     <p:spTree>
@@ -7235,7 +7488,7 @@
 </p:sld>
 </file>
 
-<file path=ppt/slides/slide22.xml><?xml version="1.0" encoding="utf-8"?>
+<file path=ppt/slides/slide24.xml><?xml version="1.0" encoding="utf-8"?>
 <p:sld xmlns:a="http://schemas.openxmlformats.org/drawingml/2006/main" xmlns:r="http://schemas.openxmlformats.org/officeDocument/2006/relationships" xmlns:p="http://schemas.openxmlformats.org/presentationml/2006/main">
   <p:cSld>
     <p:spTree>
@@ -7293,19 +7546,7 @@
           <a:p>
             <a:r>
               <a:rPr lang="en-US" dirty="0" smtClean="0"/>
-              <a:t>Throwing </a:t>
-            </a:r>
-            <a:r>
-              <a:rPr lang="en-US" dirty="0" smtClean="0"/>
-              <a:t>&amp; Catching : </a:t>
-            </a:r>
-            <a:r>
-              <a:rPr lang="en-US" dirty="0" smtClean="0"/>
-              <a:t>Validation </a:t>
-            </a:r>
-            <a:r>
-              <a:rPr lang="en-US" dirty="0" smtClean="0"/>
-              <a:t>Filter</a:t>
+              <a:t>Throwing &amp; Catching : Validation Filter</a:t>
             </a:r>
             <a:endParaRPr lang="fr-FR" dirty="0"/>
           </a:p>
@@ -7492,7 +7733,7 @@
 </p:sld>
 </file>
 
-<file path=ppt/slides/slide23.xml><?xml version="1.0" encoding="utf-8"?>
+<file path=ppt/slides/slide25.xml><?xml version="1.0" encoding="utf-8"?>
 <p:sld xmlns:a="http://schemas.openxmlformats.org/drawingml/2006/main" xmlns:r="http://schemas.openxmlformats.org/officeDocument/2006/relationships" xmlns:p="http://schemas.openxmlformats.org/presentationml/2006/main">
   <p:cSld>
     <p:spTree>
@@ -7672,7 +7913,7 @@
 </p:sld>
 </file>
 
-<file path=ppt/slides/slide24.xml><?xml version="1.0" encoding="utf-8"?>
+<file path=ppt/slides/slide26.xml><?xml version="1.0" encoding="utf-8"?>
 <p:sld xmlns:a="http://schemas.openxmlformats.org/drawingml/2006/main" xmlns:r="http://schemas.openxmlformats.org/officeDocument/2006/relationships" xmlns:p="http://schemas.openxmlformats.org/presentationml/2006/main">
   <p:cSld>
     <p:spTree>
@@ -7852,7 +8093,7 @@
 </p:sld>
 </file>
 
-<file path=ppt/slides/slide25.xml><?xml version="1.0" encoding="utf-8"?>
+<file path=ppt/slides/slide27.xml><?xml version="1.0" encoding="utf-8"?>
 <p:sld xmlns:a="http://schemas.openxmlformats.org/drawingml/2006/main" xmlns:r="http://schemas.openxmlformats.org/officeDocument/2006/relationships" xmlns:p="http://schemas.openxmlformats.org/presentationml/2006/main">
   <p:cSld>
     <p:spTree>
@@ -8268,7 +8509,7 @@
 </p:sld>
 </file>
 
-<file path=ppt/slides/slide26.xml><?xml version="1.0" encoding="utf-8"?>
+<file path=ppt/slides/slide28.xml><?xml version="1.0" encoding="utf-8"?>
 <p:sld xmlns:a="http://schemas.openxmlformats.org/drawingml/2006/main" xmlns:r="http://schemas.openxmlformats.org/officeDocument/2006/relationships" xmlns:p="http://schemas.openxmlformats.org/presentationml/2006/main">
   <p:cSld>
     <p:spTree>
@@ -8493,7 +8734,7 @@
 </p:sld>
 </file>
 
-<file path=ppt/slides/slide27.xml><?xml version="1.0" encoding="utf-8"?>
+<file path=ppt/slides/slide29.xml><?xml version="1.0" encoding="utf-8"?>
 <p:sld xmlns:a="http://schemas.openxmlformats.org/drawingml/2006/main" xmlns:r="http://schemas.openxmlformats.org/officeDocument/2006/relationships" xmlns:p="http://schemas.openxmlformats.org/presentationml/2006/main">
   <p:cSld>
     <p:spTree>
@@ -8729,10 +8970,6 @@
               </a:rPr>
               <a:t> API</a:t>
             </a:r>
-            <a:endParaRPr lang="fr-FR" sz="2400" dirty="0" smtClean="0">
-              <a:latin typeface="Century Gothic"/>
-              <a:cs typeface="Century Gothic"/>
-            </a:endParaRPr>
           </a:p>
         </p:txBody>
       </p:sp>
@@ -8740,262 +8977,6 @@
     <p:extLst>
       <p:ext uri="{BB962C8B-B14F-4D97-AF65-F5344CB8AC3E}">
         <p14:creationId xmlns:p14="http://schemas.microsoft.com/office/powerpoint/2010/main" val="1626189114"/>
-      </p:ext>
-    </p:extLst>
-  </p:cSld>
-  <p:clrMapOvr>
-    <a:masterClrMapping/>
-  </p:clrMapOvr>
-  <p:timing>
-    <p:tnLst>
-      <p:par>
-        <p:cTn id="1" dur="indefinite" restart="never" nodeType="tmRoot"/>
-      </p:par>
-    </p:tnLst>
-  </p:timing>
-</p:sld>
-</file>
-
-<file path=ppt/slides/slide28.xml><?xml version="1.0" encoding="utf-8"?>
-<p:sld xmlns:a="http://schemas.openxmlformats.org/drawingml/2006/main" xmlns:r="http://schemas.openxmlformats.org/officeDocument/2006/relationships" xmlns:p="http://schemas.openxmlformats.org/presentationml/2006/main">
-  <p:cSld>
-    <p:spTree>
-      <p:nvGrpSpPr>
-        <p:cNvPr id="1" name=""/>
-        <p:cNvGrpSpPr/>
-        <p:nvPr/>
-      </p:nvGrpSpPr>
-      <p:grpSpPr>
-        <a:xfrm>
-          <a:off x="0" y="0"/>
-          <a:ext cx="0" cy="0"/>
-          <a:chOff x="0" y="0"/>
-          <a:chExt cx="0" cy="0"/>
-        </a:xfrm>
-      </p:grpSpPr>
-      <p:pic>
-        <p:nvPicPr>
-          <p:cNvPr id="5" name="Picture 4"/>
-          <p:cNvPicPr>
-            <a:picLocks noChangeAspect="1"/>
-          </p:cNvPicPr>
-          <p:nvPr/>
-        </p:nvPicPr>
-        <p:blipFill>
-          <a:blip r:embed="rId2"/>
-          <a:stretch>
-            <a:fillRect/>
-          </a:stretch>
-        </p:blipFill>
-        <p:spPr>
-          <a:xfrm>
-            <a:off x="457200" y="1073414"/>
-            <a:ext cx="2409825" cy="4695825"/>
-          </a:xfrm>
-          <a:prstGeom prst="rect">
-            <a:avLst/>
-          </a:prstGeom>
-        </p:spPr>
-      </p:pic>
-      <p:sp>
-        <p:nvSpPr>
-          <p:cNvPr id="2" name="Title 1"/>
-          <p:cNvSpPr>
-            <a:spLocks noGrp="1"/>
-          </p:cNvSpPr>
-          <p:nvPr>
-            <p:ph type="title"/>
-          </p:nvPr>
-        </p:nvSpPr>
-        <p:spPr/>
-        <p:txBody>
-          <a:bodyPr/>
-          <a:lstStyle/>
-          <a:p>
-            <a:r>
-              <a:rPr lang="en-US" dirty="0" smtClean="0"/>
-              <a:t>Setting up the </a:t>
-            </a:r>
-            <a:r>
-              <a:rPr lang="en-US" dirty="0" smtClean="0"/>
-              <a:t>API : Exceptions</a:t>
-            </a:r>
-            <a:endParaRPr lang="fr-FR" dirty="0"/>
-          </a:p>
-        </p:txBody>
-      </p:sp>
-      <p:sp>
-        <p:nvSpPr>
-          <p:cNvPr id="6" name="Rounded Rectangle 5"/>
-          <p:cNvSpPr/>
-          <p:nvPr/>
-        </p:nvSpPr>
-        <p:spPr>
-          <a:xfrm>
-            <a:off x="597242" y="2411548"/>
-            <a:ext cx="1849395" cy="397555"/>
-          </a:xfrm>
-          <a:prstGeom prst="roundRect">
-            <a:avLst/>
-          </a:prstGeom>
-          <a:noFill/>
-          <a:ln/>
-        </p:spPr>
-        <p:style>
-          <a:lnRef idx="2">
-            <a:schemeClr val="accent6"/>
-          </a:lnRef>
-          <a:fillRef idx="1">
-            <a:schemeClr val="lt1"/>
-          </a:fillRef>
-          <a:effectRef idx="0">
-            <a:schemeClr val="accent6"/>
-          </a:effectRef>
-          <a:fontRef idx="minor">
-            <a:schemeClr val="dk1"/>
-          </a:fontRef>
-        </p:style>
-        <p:txBody>
-          <a:bodyPr rot="0" spcFirstLastPara="0" vertOverflow="overflow" horzOverflow="overflow" vert="horz" wrap="square" lIns="91440" tIns="45720" rIns="91440" bIns="45720" numCol="1" spcCol="0" rtlCol="0" fromWordArt="0" anchor="ctr" anchorCtr="0" forceAA="0" compatLnSpc="1">
-            <a:prstTxWarp prst="textNoShape">
-              <a:avLst/>
-            </a:prstTxWarp>
-            <a:noAutofit/>
-          </a:bodyPr>
-          <a:lstStyle/>
-          <a:p>
-            <a:pPr algn="ctr"/>
-            <a:endParaRPr lang="fr-FR"/>
-          </a:p>
-        </p:txBody>
-      </p:sp>
-      <p:pic>
-        <p:nvPicPr>
-          <p:cNvPr id="3" name="Picture 2"/>
-          <p:cNvPicPr>
-            <a:picLocks noChangeAspect="1"/>
-          </p:cNvPicPr>
-          <p:nvPr/>
-        </p:nvPicPr>
-        <p:blipFill>
-          <a:blip r:embed="rId3"/>
-          <a:stretch>
-            <a:fillRect/>
-          </a:stretch>
-        </p:blipFill>
-        <p:spPr>
-          <a:xfrm>
-            <a:off x="2842314" y="3402321"/>
-            <a:ext cx="6286500" cy="2381250"/>
-          </a:xfrm>
-          <a:prstGeom prst="rect">
-            <a:avLst/>
-          </a:prstGeom>
-        </p:spPr>
-      </p:pic>
-      <p:pic>
-        <p:nvPicPr>
-          <p:cNvPr id="7" name="Picture 6"/>
-          <p:cNvPicPr>
-            <a:picLocks noChangeAspect="1"/>
-          </p:cNvPicPr>
-          <p:nvPr/>
-        </p:nvPicPr>
-        <p:blipFill>
-          <a:blip r:embed="rId4"/>
-          <a:stretch>
-            <a:fillRect/>
-          </a:stretch>
-        </p:blipFill>
-        <p:spPr>
-          <a:xfrm>
-            <a:off x="2838706" y="1256405"/>
-            <a:ext cx="5762625" cy="2019300"/>
-          </a:xfrm>
-          <a:prstGeom prst="rect">
-            <a:avLst/>
-          </a:prstGeom>
-        </p:spPr>
-      </p:pic>
-    </p:spTree>
-    <p:extLst>
-      <p:ext uri="{BB962C8B-B14F-4D97-AF65-F5344CB8AC3E}">
-        <p14:creationId xmlns:p14="http://schemas.microsoft.com/office/powerpoint/2010/main" val="2656316897"/>
-      </p:ext>
-    </p:extLst>
-  </p:cSld>
-  <p:clrMapOvr>
-    <a:masterClrMapping/>
-  </p:clrMapOvr>
-  <p:timing>
-    <p:tnLst>
-      <p:par>
-        <p:cTn id="1" dur="indefinite" restart="never" nodeType="tmRoot"/>
-      </p:par>
-    </p:tnLst>
-  </p:timing>
-</p:sld>
-</file>
-
-<file path=ppt/slides/slide29.xml><?xml version="1.0" encoding="utf-8"?>
-<p:sld xmlns:a="http://schemas.openxmlformats.org/drawingml/2006/main" xmlns:r="http://schemas.openxmlformats.org/officeDocument/2006/relationships" xmlns:p="http://schemas.openxmlformats.org/presentationml/2006/main">
-  <p:cSld>
-    <p:spTree>
-      <p:nvGrpSpPr>
-        <p:cNvPr id="1" name=""/>
-        <p:cNvGrpSpPr/>
-        <p:nvPr/>
-      </p:nvGrpSpPr>
-      <p:grpSpPr>
-        <a:xfrm>
-          <a:off x="0" y="0"/>
-          <a:ext cx="0" cy="0"/>
-          <a:chOff x="0" y="0"/>
-          <a:chExt cx="0" cy="0"/>
-        </a:xfrm>
-      </p:grpSpPr>
-      <p:sp>
-        <p:nvSpPr>
-          <p:cNvPr id="2" name="Title 1"/>
-          <p:cNvSpPr>
-            <a:spLocks noGrp="1"/>
-          </p:cNvSpPr>
-          <p:nvPr>
-            <p:ph type="title"/>
-          </p:nvPr>
-        </p:nvSpPr>
-        <p:spPr/>
-        <p:txBody>
-          <a:bodyPr/>
-          <a:lstStyle/>
-          <a:p>
-            <a:endParaRPr lang="fr-FR"/>
-          </a:p>
-        </p:txBody>
-      </p:sp>
-      <p:sp>
-        <p:nvSpPr>
-          <p:cNvPr id="3" name="Content Placeholder 2"/>
-          <p:cNvSpPr>
-            <a:spLocks noGrp="1"/>
-          </p:cNvSpPr>
-          <p:nvPr>
-            <p:ph idx="1"/>
-          </p:nvPr>
-        </p:nvSpPr>
-        <p:spPr/>
-        <p:txBody>
-          <a:bodyPr/>
-          <a:lstStyle/>
-          <a:p>
-            <a:endParaRPr lang="fr-FR"/>
-          </a:p>
-        </p:txBody>
-      </p:sp>
-    </p:spTree>
-    <p:extLst>
-      <p:ext uri="{BB962C8B-B14F-4D97-AF65-F5344CB8AC3E}">
-        <p14:creationId xmlns:p14="http://schemas.microsoft.com/office/powerpoint/2010/main" val="4044168673"/>
       </p:ext>
     </p:extLst>
   </p:cSld>
@@ -9094,15 +9075,7 @@
             </a:pPr>
             <a:r>
               <a:rPr lang="en-US" sz="2800" dirty="0" smtClean="0"/>
-              <a:t>Server </a:t>
-            </a:r>
-            <a:r>
-              <a:rPr lang="en-US" sz="2800" dirty="0" smtClean="0"/>
-              <a:t>is responsible    =   </a:t>
-            </a:r>
-            <a:r>
-              <a:rPr lang="en-US" sz="2800" dirty="0" smtClean="0"/>
-              <a:t>unhandled exceptions</a:t>
+              <a:t>Server is responsible    =   unhandled exceptions</a:t>
             </a:r>
           </a:p>
         </p:txBody>
@@ -9277,14 +9250,7 @@
                 <a:latin typeface="Century Gothic"/>
                 <a:cs typeface="Century Gothic"/>
               </a:rPr>
-              <a:t>unhandled </a:t>
-            </a:r>
-            <a:r>
-              <a:rPr lang="en-US" sz="1600" dirty="0" smtClean="0">
-                <a:latin typeface="Century Gothic"/>
-                <a:cs typeface="Century Gothic"/>
-              </a:rPr>
-              <a:t>yet</a:t>
+              <a:t>unhandled yet</a:t>
             </a:r>
             <a:r>
               <a:rPr lang="fr-FR" sz="1600" dirty="0" smtClean="0">
@@ -9759,6 +9725,255 @@
           <a:chExt cx="0" cy="0"/>
         </a:xfrm>
       </p:grpSpPr>
+      <p:pic>
+        <p:nvPicPr>
+          <p:cNvPr id="5" name="Picture 4"/>
+          <p:cNvPicPr>
+            <a:picLocks noChangeAspect="1"/>
+          </p:cNvPicPr>
+          <p:nvPr/>
+        </p:nvPicPr>
+        <p:blipFill>
+          <a:blip r:embed="rId2"/>
+          <a:stretch>
+            <a:fillRect/>
+          </a:stretch>
+        </p:blipFill>
+        <p:spPr>
+          <a:xfrm>
+            <a:off x="457200" y="1073414"/>
+            <a:ext cx="2409825" cy="4695825"/>
+          </a:xfrm>
+          <a:prstGeom prst="rect">
+            <a:avLst/>
+          </a:prstGeom>
+        </p:spPr>
+      </p:pic>
+      <p:sp>
+        <p:nvSpPr>
+          <p:cNvPr id="2" name="Title 1"/>
+          <p:cNvSpPr>
+            <a:spLocks noGrp="1"/>
+          </p:cNvSpPr>
+          <p:nvPr>
+            <p:ph type="title"/>
+          </p:nvPr>
+        </p:nvSpPr>
+        <p:spPr/>
+        <p:txBody>
+          <a:bodyPr/>
+          <a:lstStyle/>
+          <a:p>
+            <a:r>
+              <a:rPr lang="en-US" dirty="0" smtClean="0"/>
+              <a:t>Throwing &amp; Catching: </a:t>
+            </a:r>
+            <a:r>
+              <a:rPr lang="en-US" dirty="0" smtClean="0"/>
+              <a:t>Exceptions</a:t>
+            </a:r>
+            <a:endParaRPr lang="fr-FR" dirty="0"/>
+          </a:p>
+        </p:txBody>
+      </p:sp>
+      <p:sp>
+        <p:nvSpPr>
+          <p:cNvPr id="6" name="Rounded Rectangle 5"/>
+          <p:cNvSpPr/>
+          <p:nvPr/>
+        </p:nvSpPr>
+        <p:spPr>
+          <a:xfrm>
+            <a:off x="597242" y="2411548"/>
+            <a:ext cx="1849395" cy="397555"/>
+          </a:xfrm>
+          <a:prstGeom prst="roundRect">
+            <a:avLst/>
+          </a:prstGeom>
+          <a:noFill/>
+          <a:ln/>
+        </p:spPr>
+        <p:style>
+          <a:lnRef idx="2">
+            <a:schemeClr val="accent6"/>
+          </a:lnRef>
+          <a:fillRef idx="1">
+            <a:schemeClr val="lt1"/>
+          </a:fillRef>
+          <a:effectRef idx="0">
+            <a:schemeClr val="accent6"/>
+          </a:effectRef>
+          <a:fontRef idx="minor">
+            <a:schemeClr val="dk1"/>
+          </a:fontRef>
+        </p:style>
+        <p:txBody>
+          <a:bodyPr rot="0" spcFirstLastPara="0" vertOverflow="overflow" horzOverflow="overflow" vert="horz" wrap="square" lIns="91440" tIns="45720" rIns="91440" bIns="45720" numCol="1" spcCol="0" rtlCol="0" fromWordArt="0" anchor="ctr" anchorCtr="0" forceAA="0" compatLnSpc="1">
+            <a:prstTxWarp prst="textNoShape">
+              <a:avLst/>
+            </a:prstTxWarp>
+            <a:noAutofit/>
+          </a:bodyPr>
+          <a:lstStyle/>
+          <a:p>
+            <a:pPr algn="ctr"/>
+            <a:endParaRPr lang="fr-FR"/>
+          </a:p>
+        </p:txBody>
+      </p:sp>
+      <p:pic>
+        <p:nvPicPr>
+          <p:cNvPr id="3" name="Picture 2"/>
+          <p:cNvPicPr>
+            <a:picLocks noChangeAspect="1"/>
+          </p:cNvPicPr>
+          <p:nvPr/>
+        </p:nvPicPr>
+        <p:blipFill>
+          <a:blip r:embed="rId3"/>
+          <a:stretch>
+            <a:fillRect/>
+          </a:stretch>
+        </p:blipFill>
+        <p:spPr>
+          <a:xfrm>
+            <a:off x="2842314" y="3402321"/>
+            <a:ext cx="6286500" cy="2381250"/>
+          </a:xfrm>
+          <a:prstGeom prst="rect">
+            <a:avLst/>
+          </a:prstGeom>
+        </p:spPr>
+      </p:pic>
+      <p:pic>
+        <p:nvPicPr>
+          <p:cNvPr id="7" name="Picture 6"/>
+          <p:cNvPicPr>
+            <a:picLocks noChangeAspect="1"/>
+          </p:cNvPicPr>
+          <p:nvPr/>
+        </p:nvPicPr>
+        <p:blipFill>
+          <a:blip r:embed="rId4"/>
+          <a:stretch>
+            <a:fillRect/>
+          </a:stretch>
+        </p:blipFill>
+        <p:spPr>
+          <a:xfrm>
+            <a:off x="2838706" y="1256405"/>
+            <a:ext cx="5762625" cy="2019300"/>
+          </a:xfrm>
+          <a:prstGeom prst="rect">
+            <a:avLst/>
+          </a:prstGeom>
+        </p:spPr>
+      </p:pic>
+    </p:spTree>
+    <p:extLst>
+      <p:ext uri="{BB962C8B-B14F-4D97-AF65-F5344CB8AC3E}">
+        <p14:creationId xmlns:p14="http://schemas.microsoft.com/office/powerpoint/2010/main" val="2656316897"/>
+      </p:ext>
+    </p:extLst>
+  </p:cSld>
+  <p:clrMapOvr>
+    <a:masterClrMapping/>
+  </p:clrMapOvr>
+  <p:timing>
+    <p:tnLst>
+      <p:par>
+        <p:cTn id="1" dur="indefinite" restart="never" nodeType="tmRoot"/>
+      </p:par>
+    </p:tnLst>
+  </p:timing>
+</p:sld>
+</file>
+
+<file path=ppt/slides/slide31.xml><?xml version="1.0" encoding="utf-8"?>
+<p:sld xmlns:a="http://schemas.openxmlformats.org/drawingml/2006/main" xmlns:r="http://schemas.openxmlformats.org/officeDocument/2006/relationships" xmlns:p="http://schemas.openxmlformats.org/presentationml/2006/main">
+  <p:cSld>
+    <p:spTree>
+      <p:nvGrpSpPr>
+        <p:cNvPr id="1" name=""/>
+        <p:cNvGrpSpPr/>
+        <p:nvPr/>
+      </p:nvGrpSpPr>
+      <p:grpSpPr>
+        <a:xfrm>
+          <a:off x="0" y="0"/>
+          <a:ext cx="0" cy="0"/>
+          <a:chOff x="0" y="0"/>
+          <a:chExt cx="0" cy="0"/>
+        </a:xfrm>
+      </p:grpSpPr>
+      <p:sp>
+        <p:nvSpPr>
+          <p:cNvPr id="2" name="Title 1"/>
+          <p:cNvSpPr>
+            <a:spLocks noGrp="1"/>
+          </p:cNvSpPr>
+          <p:nvPr>
+            <p:ph type="title"/>
+          </p:nvPr>
+        </p:nvSpPr>
+        <p:spPr>
+          <a:xfrm>
+            <a:off x="778476" y="3264973"/>
+            <a:ext cx="8229600" cy="545544"/>
+          </a:xfrm>
+        </p:spPr>
+        <p:txBody>
+          <a:bodyPr>
+            <a:noAutofit/>
+          </a:bodyPr>
+          <a:lstStyle/>
+          <a:p>
+            <a:pPr algn="ctr"/>
+            <a:r>
+              <a:rPr lang="fr-FR" sz="3600" dirty="0" smtClean="0"/>
+              <a:t>The Validation Pipeline</a:t>
+            </a:r>
+            <a:endParaRPr lang="fr-FR" sz="3600" dirty="0"/>
+          </a:p>
+        </p:txBody>
+      </p:sp>
+    </p:spTree>
+    <p:extLst>
+      <p:ext uri="{BB962C8B-B14F-4D97-AF65-F5344CB8AC3E}">
+        <p14:creationId xmlns:p14="http://schemas.microsoft.com/office/powerpoint/2010/main" val="3530215175"/>
+      </p:ext>
+    </p:extLst>
+  </p:cSld>
+  <p:clrMapOvr>
+    <a:masterClrMapping/>
+  </p:clrMapOvr>
+  <p:timing>
+    <p:tnLst>
+      <p:par>
+        <p:cTn id="1" dur="indefinite" restart="never" nodeType="tmRoot"/>
+      </p:par>
+    </p:tnLst>
+  </p:timing>
+</p:sld>
+</file>
+
+<file path=ppt/slides/slide32.xml><?xml version="1.0" encoding="utf-8"?>
+<p:sld xmlns:a="http://schemas.openxmlformats.org/drawingml/2006/main" xmlns:r="http://schemas.openxmlformats.org/officeDocument/2006/relationships" xmlns:p="http://schemas.openxmlformats.org/presentationml/2006/main">
+  <p:cSld>
+    <p:spTree>
+      <p:nvGrpSpPr>
+        <p:cNvPr id="1" name=""/>
+        <p:cNvGrpSpPr/>
+        <p:nvPr/>
+      </p:nvGrpSpPr>
+      <p:grpSpPr>
+        <a:xfrm>
+          <a:off x="0" y="0"/>
+          <a:ext cx="0" cy="0"/>
+          <a:chOff x="0" y="0"/>
+          <a:chExt cx="0" cy="0"/>
+        </a:xfrm>
+      </p:grpSpPr>
       <p:sp>
         <p:nvSpPr>
           <p:cNvPr id="2" name="Title 1"/>
@@ -10040,7 +10255,7 @@
 </p:sld>
 </file>
 
-<file path=ppt/slides/slide31.xml><?xml version="1.0" encoding="utf-8"?>
+<file path=ppt/slides/slide33.xml><?xml version="1.0" encoding="utf-8"?>
 <p:sld xmlns:a="http://schemas.openxmlformats.org/drawingml/2006/main" xmlns:r="http://schemas.openxmlformats.org/officeDocument/2006/relationships" xmlns:p="http://schemas.openxmlformats.org/presentationml/2006/main">
   <p:cSld>
     <p:spTree>
@@ -10323,7 +10538,7 @@
 </p:sld>
 </file>
 
-<file path=ppt/slides/slide32.xml><?xml version="1.0" encoding="utf-8"?>
+<file path=ppt/slides/slide34.xml><?xml version="1.0" encoding="utf-8"?>
 <p:sld xmlns:a="http://schemas.openxmlformats.org/drawingml/2006/main" xmlns:r="http://schemas.openxmlformats.org/officeDocument/2006/relationships" xmlns:p="http://schemas.openxmlformats.org/presentationml/2006/main">
   <p:cSld>
     <p:spTree>
@@ -10476,7 +10691,7 @@
 </p:sld>
 </file>
 
-<file path=ppt/slides/slide33.xml><?xml version="1.0" encoding="utf-8"?>
+<file path=ppt/slides/slide35.xml><?xml version="1.0" encoding="utf-8"?>
 <p:sld xmlns:a="http://schemas.openxmlformats.org/drawingml/2006/main" xmlns:r="http://schemas.openxmlformats.org/officeDocument/2006/relationships" xmlns:p="http://schemas.openxmlformats.org/presentationml/2006/main">
   <p:cSld>
     <p:spTree>
@@ -10629,7 +10844,7 @@
 </p:sld>
 </file>
 
-<file path=ppt/slides/slide34.xml><?xml version="1.0" encoding="utf-8"?>
+<file path=ppt/slides/slide36.xml><?xml version="1.0" encoding="utf-8"?>
 <p:sld xmlns:a="http://schemas.openxmlformats.org/drawingml/2006/main" xmlns:r="http://schemas.openxmlformats.org/officeDocument/2006/relationships" xmlns:p="http://schemas.openxmlformats.org/presentationml/2006/main">
   <p:cSld>
     <p:spTree>
@@ -10685,8 +10900,8 @@
         </p:nvSpPr>
         <p:spPr>
           <a:xfrm>
-            <a:off x="457200" y="1287598"/>
-            <a:ext cx="8229600" cy="887191"/>
+            <a:off x="533400" y="1287598"/>
+            <a:ext cx="8229600" cy="486389"/>
           </a:xfrm>
         </p:spPr>
         <p:txBody>
@@ -10714,8 +10929,8 @@
         </p:nvSpPr>
         <p:spPr>
           <a:xfrm>
-            <a:off x="457200" y="2375983"/>
-            <a:ext cx="8229600" cy="887191"/>
+            <a:off x="533400" y="2437135"/>
+            <a:ext cx="8229600" cy="457833"/>
           </a:xfrm>
           <a:prstGeom prst="rect">
             <a:avLst/>
@@ -10916,8 +11131,8 @@
         </p:nvSpPr>
         <p:spPr>
           <a:xfrm>
-            <a:off x="609600" y="2977979"/>
-            <a:ext cx="8229600" cy="887191"/>
+            <a:off x="533400" y="2977980"/>
+            <a:ext cx="8229600" cy="539578"/>
           </a:xfrm>
           <a:prstGeom prst="rect">
             <a:avLst/>
@@ -11130,8 +11345,8 @@
         </p:nvSpPr>
         <p:spPr>
           <a:xfrm>
-            <a:off x="533400" y="1744281"/>
-            <a:ext cx="8229600" cy="887191"/>
+            <a:off x="533400" y="1857000"/>
+            <a:ext cx="8229600" cy="497122"/>
           </a:xfrm>
           <a:prstGeom prst="rect">
             <a:avLst/>
@@ -11338,6 +11553,82 @@
     <p:extLst>
       <p:ext uri="{BB962C8B-B14F-4D97-AF65-F5344CB8AC3E}">
         <p14:creationId xmlns:p14="http://schemas.microsoft.com/office/powerpoint/2010/main" val="1269450054"/>
+      </p:ext>
+    </p:extLst>
+  </p:cSld>
+  <p:clrMapOvr>
+    <a:masterClrMapping/>
+  </p:clrMapOvr>
+  <p:timing>
+    <p:tnLst>
+      <p:par>
+        <p:cTn id="1" dur="indefinite" restart="never" nodeType="tmRoot"/>
+      </p:par>
+    </p:tnLst>
+  </p:timing>
+</p:sld>
+</file>
+
+<file path=ppt/slides/slide37.xml><?xml version="1.0" encoding="utf-8"?>
+<p:sld xmlns:a="http://schemas.openxmlformats.org/drawingml/2006/main" xmlns:r="http://schemas.openxmlformats.org/officeDocument/2006/relationships" xmlns:p="http://schemas.openxmlformats.org/presentationml/2006/main">
+  <p:cSld>
+    <p:spTree>
+      <p:nvGrpSpPr>
+        <p:cNvPr id="1" name=""/>
+        <p:cNvGrpSpPr/>
+        <p:nvPr/>
+      </p:nvGrpSpPr>
+      <p:grpSpPr>
+        <a:xfrm>
+          <a:off x="0" y="0"/>
+          <a:ext cx="0" cy="0"/>
+          <a:chOff x="0" y="0"/>
+          <a:chExt cx="0" cy="0"/>
+        </a:xfrm>
+      </p:grpSpPr>
+      <p:sp>
+        <p:nvSpPr>
+          <p:cNvPr id="2" name="Title 1"/>
+          <p:cNvSpPr>
+            <a:spLocks noGrp="1"/>
+          </p:cNvSpPr>
+          <p:nvPr>
+            <p:ph type="title"/>
+          </p:nvPr>
+        </p:nvSpPr>
+        <p:spPr>
+          <a:xfrm>
+            <a:off x="778476" y="3264973"/>
+            <a:ext cx="8229600" cy="545544"/>
+          </a:xfrm>
+        </p:spPr>
+        <p:txBody>
+          <a:bodyPr>
+            <a:noAutofit/>
+          </a:bodyPr>
+          <a:lstStyle/>
+          <a:p>
+            <a:pPr algn="ctr"/>
+            <a:r>
+              <a:rPr lang="fr-FR" sz="3600" dirty="0" smtClean="0"/>
+              <a:t>Do </a:t>
+            </a:r>
+            <a:r>
+              <a:rPr lang="fr-FR" sz="3600" dirty="0" err="1" smtClean="0"/>
+              <a:t>you</a:t>
+            </a:r>
+            <a:r>
+              <a:rPr lang="fr-FR" sz="3600" dirty="0" smtClean="0"/>
+              <a:t> have questions ?</a:t>
+            </a:r>
+            <a:endParaRPr lang="fr-FR" sz="3600" dirty="0"/>
+          </a:p>
+        </p:txBody>
+      </p:sp>
+    </p:spTree>
+    <p:extLst>
+      <p:ext uri="{BB962C8B-B14F-4D97-AF65-F5344CB8AC3E}">
+        <p14:creationId xmlns:p14="http://schemas.microsoft.com/office/powerpoint/2010/main" val="2152946411"/>
       </p:ext>
     </p:extLst>
   </p:cSld>
@@ -12280,15 +12571,7 @@
             </a:pPr>
             <a:r>
               <a:rPr lang="en-US" sz="2800" dirty="0" smtClean="0"/>
-              <a:t>ASP.NET Web </a:t>
-            </a:r>
-            <a:r>
-              <a:rPr lang="en-US" sz="2800" dirty="0" smtClean="0"/>
-              <a:t>API </a:t>
-            </a:r>
-            <a:r>
-              <a:rPr lang="en-US" sz="2800" dirty="0" smtClean="0"/>
-              <a:t>has a default format for unhandled exceptions.</a:t>
+              <a:t>ASP.NET Web API has a default format for unhandled exceptions.</a:t>
             </a:r>
             <a:endParaRPr lang="fr-FR" sz="2800" dirty="0"/>
           </a:p>

</xml_diff>